<commit_message>
add the result of the last problem
</commit_message>
<xml_diff>
--- a/Data Analysis1.pptx
+++ b/Data Analysis1.pptx
@@ -5,7 +5,7 @@
     <p:sldMasterId id="2147483648" r:id="rId1"/>
   </p:sldMasterIdLst>
   <p:notesMasterIdLst>
-    <p:notesMasterId r:id="rId15"/>
+    <p:notesMasterId r:id="rId13"/>
   </p:notesMasterIdLst>
   <p:sldIdLst>
     <p:sldId id="256" r:id="rId2"/>
@@ -18,9 +18,7 @@
     <p:sldId id="264" r:id="rId9"/>
     <p:sldId id="265" r:id="rId10"/>
     <p:sldId id="266" r:id="rId11"/>
-    <p:sldId id="267" r:id="rId12"/>
-    <p:sldId id="268" r:id="rId13"/>
-    <p:sldId id="260" r:id="rId14"/>
+    <p:sldId id="260" r:id="rId12"/>
   </p:sldIdLst>
   <p:sldSz cx="12192000" cy="6858000"/>
   <p:notesSz cx="6858000" cy="9144000"/>
@@ -209,7 +207,7 @@
           <a:p>
             <a:fld id="{CA9BDDB1-5C69-A245-9B24-5BF34F8634A1}" type="datetimeFigureOut">
               <a:rPr kumimoji="1" lang="zh-TW" altLang="en-US" smtClean="0"/>
-              <a:t>2016/11/15</a:t>
+              <a:t>2016/11/16</a:t>
             </a:fld>
             <a:endParaRPr kumimoji="1" lang="zh-TW" altLang="en-US"/>
           </a:p>
@@ -692,7 +690,7 @@
           <a:p>
             <a:fld id="{26BDEB85-CC7A-A04E-AAB1-1427895F37E5}" type="datetime1">
               <a:rPr kumimoji="1" lang="zh-TW" altLang="en-US" smtClean="0"/>
-              <a:t>2016/11/15</a:t>
+              <a:t>2016/11/16</a:t>
             </a:fld>
             <a:endParaRPr kumimoji="1" lang="zh-TW" altLang="en-US"/>
           </a:p>
@@ -862,7 +860,7 @@
           <a:p>
             <a:fld id="{E07B2D31-2657-FB48-AAF5-3CDD026EFA99}" type="datetime1">
               <a:rPr kumimoji="1" lang="zh-TW" altLang="en-US" smtClean="0"/>
-              <a:t>2016/11/15</a:t>
+              <a:t>2016/11/16</a:t>
             </a:fld>
             <a:endParaRPr kumimoji="1" lang="zh-TW" altLang="en-US"/>
           </a:p>
@@ -1042,7 +1040,7 @@
           <a:p>
             <a:fld id="{C83BCBE3-2949-7649-8AD4-588504E376A6}" type="datetime1">
               <a:rPr kumimoji="1" lang="zh-TW" altLang="en-US" smtClean="0"/>
-              <a:t>2016/11/15</a:t>
+              <a:t>2016/11/16</a:t>
             </a:fld>
             <a:endParaRPr kumimoji="1" lang="zh-TW" altLang="en-US"/>
           </a:p>
@@ -1212,7 +1210,7 @@
           <a:p>
             <a:fld id="{8F942238-3C80-C742-B499-ECD2BE996B96}" type="datetime1">
               <a:rPr kumimoji="1" lang="zh-TW" altLang="en-US" smtClean="0"/>
-              <a:t>2016/11/15</a:t>
+              <a:t>2016/11/16</a:t>
             </a:fld>
             <a:endParaRPr kumimoji="1" lang="zh-TW" altLang="en-US"/>
           </a:p>
@@ -1458,7 +1456,7 @@
           <a:p>
             <a:fld id="{BFB31BA2-6924-2944-96D7-DC5DCC949D70}" type="datetime1">
               <a:rPr kumimoji="1" lang="zh-TW" altLang="en-US" smtClean="0"/>
-              <a:t>2016/11/15</a:t>
+              <a:t>2016/11/16</a:t>
             </a:fld>
             <a:endParaRPr kumimoji="1" lang="zh-TW" altLang="en-US"/>
           </a:p>
@@ -1690,7 +1688,7 @@
           <a:p>
             <a:fld id="{8A589A4F-C648-224A-93A5-B40935F666C0}" type="datetime1">
               <a:rPr kumimoji="1" lang="zh-TW" altLang="en-US" smtClean="0"/>
-              <a:t>2016/11/15</a:t>
+              <a:t>2016/11/16</a:t>
             </a:fld>
             <a:endParaRPr kumimoji="1" lang="zh-TW" altLang="en-US"/>
           </a:p>
@@ -2057,7 +2055,7 @@
           <a:p>
             <a:fld id="{B189A5CF-D96E-0148-B531-49F73E2CF08B}" type="datetime1">
               <a:rPr kumimoji="1" lang="zh-TW" altLang="en-US" smtClean="0"/>
-              <a:t>2016/11/15</a:t>
+              <a:t>2016/11/16</a:t>
             </a:fld>
             <a:endParaRPr kumimoji="1" lang="zh-TW" altLang="en-US"/>
           </a:p>
@@ -2175,7 +2173,7 @@
           <a:p>
             <a:fld id="{E7032804-B961-DD41-B6B1-46B802F7413B}" type="datetime1">
               <a:rPr kumimoji="1" lang="zh-TW" altLang="en-US" smtClean="0"/>
-              <a:t>2016/11/15</a:t>
+              <a:t>2016/11/16</a:t>
             </a:fld>
             <a:endParaRPr kumimoji="1" lang="zh-TW" altLang="en-US"/>
           </a:p>
@@ -2270,7 +2268,7 @@
           <a:p>
             <a:fld id="{B74C38AF-11C1-8B41-8045-1A570A59FE65}" type="datetime1">
               <a:rPr kumimoji="1" lang="zh-TW" altLang="en-US" smtClean="0"/>
-              <a:t>2016/11/15</a:t>
+              <a:t>2016/11/16</a:t>
             </a:fld>
             <a:endParaRPr kumimoji="1" lang="zh-TW" altLang="en-US"/>
           </a:p>
@@ -2547,7 +2545,7 @@
           <a:p>
             <a:fld id="{D6A3943A-8A51-C842-8485-01C868AF909E}" type="datetime1">
               <a:rPr kumimoji="1" lang="zh-TW" altLang="en-US" smtClean="0"/>
-              <a:t>2016/11/15</a:t>
+              <a:t>2016/11/16</a:t>
             </a:fld>
             <a:endParaRPr kumimoji="1" lang="zh-TW" altLang="en-US"/>
           </a:p>
@@ -2800,7 +2798,7 @@
           <a:p>
             <a:fld id="{118BDB92-69FD-B34E-B3C4-F4AF59B85BCC}" type="datetime1">
               <a:rPr kumimoji="1" lang="zh-TW" altLang="en-US" smtClean="0"/>
-              <a:t>2016/11/15</a:t>
+              <a:t>2016/11/16</a:t>
             </a:fld>
             <a:endParaRPr kumimoji="1" lang="zh-TW" altLang="en-US"/>
           </a:p>
@@ -3023,7 +3021,7 @@
           <a:p>
             <a:fld id="{13BD3E26-2687-B14A-93C9-338BCF8145DA}" type="datetime1">
               <a:rPr kumimoji="1" lang="zh-TW" altLang="en-US" smtClean="0"/>
-              <a:t>2016/11/15</a:t>
+              <a:t>2016/11/16</a:t>
             </a:fld>
             <a:endParaRPr kumimoji="1" lang="zh-TW" altLang="en-US"/>
           </a:p>
@@ -3708,36 +3706,6 @@
       </p:sp>
       <p:sp>
         <p:nvSpPr>
-          <p:cNvPr id="3" name="內容版面配置區 2"/>
-          <p:cNvSpPr>
-            <a:spLocks noGrp="1"/>
-          </p:cNvSpPr>
-          <p:nvPr>
-            <p:ph idx="1"/>
-          </p:nvPr>
-        </p:nvSpPr>
-        <p:spPr>
-          <a:xfrm>
-            <a:off x="838200" y="1825625"/>
-            <a:ext cx="10515600" cy="4674030"/>
-          </a:xfrm>
-        </p:spPr>
-        <p:txBody>
-          <a:bodyPr>
-            <a:normAutofit/>
-          </a:bodyPr>
-          <a:lstStyle/>
-          <a:p>
-            <a:endParaRPr kumimoji="1" lang="en-US" altLang="zh-TW" sz="2200" dirty="0" smtClean="0">
-              <a:latin typeface="Century" charset="0"/>
-              <a:ea typeface="Century" charset="0"/>
-              <a:cs typeface="Century" charset="0"/>
-            </a:endParaRPr>
-          </a:p>
-        </p:txBody>
-      </p:sp>
-      <p:sp>
-        <p:nvSpPr>
           <p:cNvPr id="6" name="投影片編號版面配置區 5"/>
           <p:cNvSpPr>
             <a:spLocks noGrp="1"/>
@@ -3759,6 +3727,47 @@
           </a:p>
         </p:txBody>
       </p:sp>
+      <p:pic>
+        <p:nvPicPr>
+          <p:cNvPr id="1026" name="Picture 2" descr="https://lh3.googleusercontent.com/5_V9Y_yWVScFOkBuiF2r4iCNLLjxggWrbNEk-_roREKmk7Ipt4yVmUqZj0htD0X6qKTBrjsayyTF2M94g9t028VY5OevXOfH9AJTGPYWU2gh-oTlPoBHkwVU102jLwD-cFwdkddw"/>
+          <p:cNvPicPr>
+            <a:picLocks noGrp="1" noChangeAspect="1" noChangeArrowheads="1"/>
+          </p:cNvPicPr>
+          <p:nvPr>
+            <p:ph idx="1"/>
+          </p:nvPr>
+        </p:nvPicPr>
+        <p:blipFill rotWithShape="1">
+          <a:blip r:embed="rId3">
+            <a:extLst>
+              <a:ext uri="{28A0092B-C50C-407E-A947-70E740481C1C}">
+                <a14:useLocalDpi xmlns:a14="http://schemas.microsoft.com/office/drawing/2010/main" val="0"/>
+              </a:ext>
+            </a:extLst>
+          </a:blip>
+          <a:srcRect l="14088" t="35422" r="43049" b="12061"/>
+          <a:stretch/>
+        </p:blipFill>
+        <p:spPr bwMode="auto">
+          <a:xfrm>
+            <a:off x="2526251" y="1795870"/>
+            <a:ext cx="6882065" cy="4743042"/>
+          </a:xfrm>
+          <a:prstGeom prst="rect">
+            <a:avLst/>
+          </a:prstGeom>
+          <a:noFill/>
+          <a:extLst>
+            <a:ext uri="{909E8E84-426E-40DD-AFC4-6F175D3DCCD1}">
+              <a14:hiddenFill xmlns:a14="http://schemas.microsoft.com/office/drawing/2010/main">
+                <a:solidFill>
+                  <a:srgbClr val="FFFFFF"/>
+                </a:solidFill>
+              </a14:hiddenFill>
+            </a:ext>
+          </a:extLst>
+        </p:spPr>
+      </p:pic>
     </p:spTree>
     <p:extLst>
       <p:ext uri="{BB962C8B-B14F-4D97-AF65-F5344CB8AC3E}">
@@ -3816,262 +3825,6 @@
         </p:nvSpPr>
         <p:spPr>
           <a:xfrm>
-            <a:off x="580768" y="365125"/>
-            <a:ext cx="10773032" cy="1325563"/>
-          </a:xfrm>
-        </p:spPr>
-        <p:txBody>
-          <a:bodyPr>
-            <a:normAutofit/>
-          </a:bodyPr>
-          <a:lstStyle/>
-          <a:p>
-            <a:endParaRPr kumimoji="1" lang="zh-TW" altLang="en-US" sz="4800" b="1" dirty="0">
-              <a:latin typeface="Yuppy TC" charset="-120"/>
-              <a:ea typeface="Yuppy TC" charset="-120"/>
-              <a:cs typeface="Yuppy TC" charset="-120"/>
-            </a:endParaRPr>
-          </a:p>
-        </p:txBody>
-      </p:sp>
-      <p:sp>
-        <p:nvSpPr>
-          <p:cNvPr id="3" name="內容版面配置區 2"/>
-          <p:cNvSpPr>
-            <a:spLocks noGrp="1"/>
-          </p:cNvSpPr>
-          <p:nvPr>
-            <p:ph idx="1"/>
-          </p:nvPr>
-        </p:nvSpPr>
-        <p:spPr>
-          <a:xfrm>
-            <a:off x="838200" y="1825625"/>
-            <a:ext cx="10515600" cy="4674030"/>
-          </a:xfrm>
-        </p:spPr>
-        <p:txBody>
-          <a:bodyPr>
-            <a:normAutofit/>
-          </a:bodyPr>
-          <a:lstStyle/>
-          <a:p>
-            <a:endParaRPr kumimoji="1" lang="en-US" altLang="zh-TW" sz="2200" dirty="0" smtClean="0">
-              <a:latin typeface="Century" charset="0"/>
-              <a:ea typeface="Century" charset="0"/>
-              <a:cs typeface="Century" charset="0"/>
-            </a:endParaRPr>
-          </a:p>
-        </p:txBody>
-      </p:sp>
-      <p:sp>
-        <p:nvSpPr>
-          <p:cNvPr id="6" name="投影片編號版面配置區 5"/>
-          <p:cNvSpPr>
-            <a:spLocks noGrp="1"/>
-          </p:cNvSpPr>
-          <p:nvPr>
-            <p:ph type="sldNum" sz="quarter" idx="12"/>
-          </p:nvPr>
-        </p:nvSpPr>
-        <p:spPr/>
-        <p:txBody>
-          <a:bodyPr/>
-          <a:lstStyle/>
-          <a:p>
-            <a:fld id="{0D69699B-27C4-2E4A-AEDA-40780AF0A786}" type="slidenum">
-              <a:rPr kumimoji="1" lang="zh-TW" altLang="en-US" smtClean="0"/>
-              <a:t>10</a:t>
-            </a:fld>
-            <a:endParaRPr kumimoji="1" lang="zh-TW" altLang="en-US"/>
-          </a:p>
-        </p:txBody>
-      </p:sp>
-    </p:spTree>
-    <p:extLst>
-      <p:ext uri="{BB962C8B-B14F-4D97-AF65-F5344CB8AC3E}">
-        <p14:creationId xmlns:p14="http://schemas.microsoft.com/office/powerpoint/2010/main" val="631194798"/>
-      </p:ext>
-    </p:extLst>
-  </p:cSld>
-  <p:clrMapOvr>
-    <a:masterClrMapping/>
-  </p:clrMapOvr>
-</p:sld>
-</file>
-
-<file path=ppt/slides/slide12.xml><?xml version="1.0" encoding="utf-8"?>
-<p:sld xmlns:a="http://schemas.openxmlformats.org/drawingml/2006/main" xmlns:r="http://schemas.openxmlformats.org/officeDocument/2006/relationships" xmlns:p="http://schemas.openxmlformats.org/presentationml/2006/main">
-  <p:cSld>
-    <p:bg>
-      <p:bgPr>
-        <a:blipFill dpi="0" rotWithShape="1">
-          <a:blip r:embed="rId2">
-            <a:alphaModFix amt="30000"/>
-            <a:lum/>
-          </a:blip>
-          <a:srcRect/>
-          <a:stretch>
-            <a:fillRect l="-1000" t="-3000" b="-6000"/>
-          </a:stretch>
-        </a:blipFill>
-        <a:effectLst/>
-      </p:bgPr>
-    </p:bg>
-    <p:spTree>
-      <p:nvGrpSpPr>
-        <p:cNvPr id="1" name=""/>
-        <p:cNvGrpSpPr/>
-        <p:nvPr/>
-      </p:nvGrpSpPr>
-      <p:grpSpPr>
-        <a:xfrm>
-          <a:off x="0" y="0"/>
-          <a:ext cx="0" cy="0"/>
-          <a:chOff x="0" y="0"/>
-          <a:chExt cx="0" cy="0"/>
-        </a:xfrm>
-      </p:grpSpPr>
-      <p:sp>
-        <p:nvSpPr>
-          <p:cNvPr id="2" name="標題 1"/>
-          <p:cNvSpPr>
-            <a:spLocks noGrp="1"/>
-          </p:cNvSpPr>
-          <p:nvPr>
-            <p:ph type="title"/>
-          </p:nvPr>
-        </p:nvSpPr>
-        <p:spPr>
-          <a:xfrm>
-            <a:off x="580768" y="365125"/>
-            <a:ext cx="10773032" cy="1325563"/>
-          </a:xfrm>
-        </p:spPr>
-        <p:txBody>
-          <a:bodyPr>
-            <a:normAutofit/>
-          </a:bodyPr>
-          <a:lstStyle/>
-          <a:p>
-            <a:endParaRPr kumimoji="1" lang="zh-TW" altLang="en-US" sz="4800" b="1" dirty="0">
-              <a:latin typeface="Yuppy TC" charset="-120"/>
-              <a:ea typeface="Yuppy TC" charset="-120"/>
-              <a:cs typeface="Yuppy TC" charset="-120"/>
-            </a:endParaRPr>
-          </a:p>
-        </p:txBody>
-      </p:sp>
-      <p:sp>
-        <p:nvSpPr>
-          <p:cNvPr id="3" name="內容版面配置區 2"/>
-          <p:cNvSpPr>
-            <a:spLocks noGrp="1"/>
-          </p:cNvSpPr>
-          <p:nvPr>
-            <p:ph idx="1"/>
-          </p:nvPr>
-        </p:nvSpPr>
-        <p:spPr>
-          <a:xfrm>
-            <a:off x="838200" y="1825625"/>
-            <a:ext cx="10515600" cy="4674030"/>
-          </a:xfrm>
-        </p:spPr>
-        <p:txBody>
-          <a:bodyPr>
-            <a:normAutofit/>
-          </a:bodyPr>
-          <a:lstStyle/>
-          <a:p>
-            <a:endParaRPr kumimoji="1" lang="en-US" altLang="zh-TW" sz="2200" dirty="0" smtClean="0">
-              <a:latin typeface="Century" charset="0"/>
-              <a:ea typeface="Century" charset="0"/>
-              <a:cs typeface="Century" charset="0"/>
-            </a:endParaRPr>
-          </a:p>
-        </p:txBody>
-      </p:sp>
-      <p:sp>
-        <p:nvSpPr>
-          <p:cNvPr id="6" name="投影片編號版面配置區 5"/>
-          <p:cNvSpPr>
-            <a:spLocks noGrp="1"/>
-          </p:cNvSpPr>
-          <p:nvPr>
-            <p:ph type="sldNum" sz="quarter" idx="12"/>
-          </p:nvPr>
-        </p:nvSpPr>
-        <p:spPr/>
-        <p:txBody>
-          <a:bodyPr/>
-          <a:lstStyle/>
-          <a:p>
-            <a:fld id="{0D69699B-27C4-2E4A-AEDA-40780AF0A786}" type="slidenum">
-              <a:rPr kumimoji="1" lang="zh-TW" altLang="en-US" smtClean="0"/>
-              <a:t>11</a:t>
-            </a:fld>
-            <a:endParaRPr kumimoji="1" lang="zh-TW" altLang="en-US"/>
-          </a:p>
-        </p:txBody>
-      </p:sp>
-    </p:spTree>
-    <p:extLst>
-      <p:ext uri="{BB962C8B-B14F-4D97-AF65-F5344CB8AC3E}">
-        <p14:creationId xmlns:p14="http://schemas.microsoft.com/office/powerpoint/2010/main" val="2069237453"/>
-      </p:ext>
-    </p:extLst>
-  </p:cSld>
-  <p:clrMapOvr>
-    <a:masterClrMapping/>
-  </p:clrMapOvr>
-</p:sld>
-</file>
-
-<file path=ppt/slides/slide13.xml><?xml version="1.0" encoding="utf-8"?>
-<p:sld xmlns:a="http://schemas.openxmlformats.org/drawingml/2006/main" xmlns:r="http://schemas.openxmlformats.org/officeDocument/2006/relationships" xmlns:p="http://schemas.openxmlformats.org/presentationml/2006/main">
-  <p:cSld>
-    <p:bg>
-      <p:bgPr>
-        <a:blipFill dpi="0" rotWithShape="1">
-          <a:blip r:embed="rId2">
-            <a:alphaModFix amt="30000"/>
-            <a:lum/>
-          </a:blip>
-          <a:srcRect/>
-          <a:stretch>
-            <a:fillRect l="-1000" t="-3000" b="-6000"/>
-          </a:stretch>
-        </a:blipFill>
-        <a:effectLst/>
-      </p:bgPr>
-    </p:bg>
-    <p:spTree>
-      <p:nvGrpSpPr>
-        <p:cNvPr id="1" name=""/>
-        <p:cNvGrpSpPr/>
-        <p:nvPr/>
-      </p:nvGrpSpPr>
-      <p:grpSpPr>
-        <a:xfrm>
-          <a:off x="0" y="0"/>
-          <a:ext cx="0" cy="0"/>
-          <a:chOff x="0" y="0"/>
-          <a:chExt cx="0" cy="0"/>
-        </a:xfrm>
-      </p:grpSpPr>
-      <p:sp>
-        <p:nvSpPr>
-          <p:cNvPr id="2" name="標題 1"/>
-          <p:cNvSpPr>
-            <a:spLocks noGrp="1"/>
-          </p:cNvSpPr>
-          <p:nvPr>
-            <p:ph type="title"/>
-          </p:nvPr>
-        </p:nvSpPr>
-        <p:spPr>
-          <a:xfrm>
             <a:off x="565079" y="365125"/>
             <a:ext cx="10788721" cy="1325563"/>
           </a:xfrm>
@@ -4186,7 +3939,7 @@
           <a:p>
             <a:fld id="{0D69699B-27C4-2E4A-AEDA-40780AF0A786}" type="slidenum">
               <a:rPr kumimoji="1" lang="zh-TW" altLang="en-US" smtClean="0"/>
-              <a:t>12</a:t>
+              <a:t>10</a:t>
             </a:fld>
             <a:endParaRPr kumimoji="1" lang="zh-TW" altLang="en-US"/>
           </a:p>
@@ -5231,15 +4984,7 @@
                 <a:ea typeface="Century" charset="0"/>
                 <a:cs typeface="Century" charset="0"/>
               </a:rPr>
-              <a:t>Then, the problem was solved</a:t>
-            </a:r>
-            <a:r>
-              <a:rPr kumimoji="1" lang="is-IS" altLang="zh-TW" sz="2200" dirty="0" smtClean="0">
-                <a:latin typeface="Century" charset="0"/>
-                <a:ea typeface="Century" charset="0"/>
-                <a:cs typeface="Century" charset="0"/>
-              </a:rPr>
-              <a:t>.</a:t>
+              <a:t>Then, the problem was solved.</a:t>
             </a:r>
             <a:endParaRPr kumimoji="1" lang="en-US" altLang="zh-TW" dirty="0"/>
           </a:p>
@@ -5440,6 +5185,8 @@
               </a:rPr>
               <a:t>Time Range: 2010/01 – 2010/12</a:t>
             </a:r>
+          </a:p>
+          <a:p>
             <a:endParaRPr kumimoji="1" lang="en-US" altLang="zh-TW" sz="2200" dirty="0" smtClean="0">
               <a:latin typeface="Century" charset="0"/>
               <a:ea typeface="Century" charset="0"/>
@@ -5447,13 +5194,6 @@
             </a:endParaRPr>
           </a:p>
           <a:p>
-            <a:endParaRPr kumimoji="1" lang="en-US" altLang="zh-TW" sz="2200" dirty="0" smtClean="0">
-              <a:latin typeface="Century" charset="0"/>
-              <a:ea typeface="Century" charset="0"/>
-              <a:cs typeface="Century" charset="0"/>
-            </a:endParaRPr>
-          </a:p>
-          <a:p>
             <a:endParaRPr kumimoji="1" lang="en-US" altLang="zh-TW" sz="2200" dirty="0">
               <a:latin typeface="Century" charset="0"/>
               <a:ea typeface="Century" charset="0"/>
@@ -5496,11 +5236,6 @@
               </a:rPr>
               <a:t>The amount of Tweets: 1305</a:t>
             </a:r>
-            <a:endParaRPr kumimoji="1" lang="en-US" altLang="zh-TW" sz="2000" dirty="0" smtClean="0">
-              <a:latin typeface="Century" charset="0"/>
-              <a:ea typeface="Century" charset="0"/>
-              <a:cs typeface="Century" charset="0"/>
-            </a:endParaRPr>
           </a:p>
         </p:txBody>
       </p:sp>
@@ -5942,15 +5677,7 @@
                 <a:ea typeface="Yuppy TC" charset="-120"/>
                 <a:cs typeface="Yuppy TC" charset="-120"/>
               </a:rPr>
-              <a:t>Monthly amount of Tweets of Twitters </a:t>
-            </a:r>
-            <a:r>
-              <a:rPr kumimoji="1" lang="en-US" altLang="zh-TW" sz="4800" b="1" dirty="0" smtClean="0">
-                <a:latin typeface="Yuppy TC" charset="-120"/>
-                <a:ea typeface="Yuppy TC" charset="-120"/>
-                <a:cs typeface="Yuppy TC" charset="-120"/>
-              </a:rPr>
-              <a:t> </a:t>
+              <a:t>Monthly amount of Tweets of Twitters  </a:t>
             </a:r>
             <a:endParaRPr kumimoji="1" lang="zh-TW" altLang="en-US" sz="4800" b="1" dirty="0">
               <a:latin typeface="Yuppy TC" charset="-120"/>

</xml_diff>